<commit_message>
Updated Ingestion with Kinesis and overview diagram
</commit_message>
<xml_diff>
--- a/src/datalake_reference_architecture.pptx
+++ b/src/datalake_reference_architecture.pptx
@@ -3293,7 +3293,7 @@
           <a:p>
             <a:fld id="{F9B19C5E-ED57-994E-AD20-45AA8859C26A}" type="datetimeFigureOut">
               <a:rPr lang="en-US" smtClean="0"/>
-              <a:t>12/27/18</a:t>
+              <a:t>1/3/19</a:t>
             </a:fld>
             <a:endParaRPr lang="en-US"/>
           </a:p>
@@ -3707,7 +3707,7 @@
           <a:p>
             <a:fld id="{8489B6BE-DF36-2D48-B10B-C50A45407260}" type="datetimeFigureOut">
               <a:rPr lang="en-US" smtClean="0"/>
-              <a:t>12/27/18</a:t>
+              <a:t>1/3/19</a:t>
             </a:fld>
             <a:endParaRPr lang="en-US"/>
           </a:p>
@@ -3905,7 +3905,7 @@
           <a:p>
             <a:fld id="{8489B6BE-DF36-2D48-B10B-C50A45407260}" type="datetimeFigureOut">
               <a:rPr lang="en-US" smtClean="0"/>
-              <a:t>12/27/18</a:t>
+              <a:t>1/3/19</a:t>
             </a:fld>
             <a:endParaRPr lang="en-US"/>
           </a:p>
@@ -4113,7 +4113,7 @@
           <a:p>
             <a:fld id="{8489B6BE-DF36-2D48-B10B-C50A45407260}" type="datetimeFigureOut">
               <a:rPr lang="en-US" smtClean="0"/>
-              <a:t>12/27/18</a:t>
+              <a:t>1/3/19</a:t>
             </a:fld>
             <a:endParaRPr lang="en-US"/>
           </a:p>
@@ -4311,7 +4311,7 @@
           <a:p>
             <a:fld id="{8489B6BE-DF36-2D48-B10B-C50A45407260}" type="datetimeFigureOut">
               <a:rPr lang="en-US" smtClean="0"/>
-              <a:t>12/27/18</a:t>
+              <a:t>1/3/19</a:t>
             </a:fld>
             <a:endParaRPr lang="en-US"/>
           </a:p>
@@ -4586,7 +4586,7 @@
           <a:p>
             <a:fld id="{8489B6BE-DF36-2D48-B10B-C50A45407260}" type="datetimeFigureOut">
               <a:rPr lang="en-US" smtClean="0"/>
-              <a:t>12/27/18</a:t>
+              <a:t>1/3/19</a:t>
             </a:fld>
             <a:endParaRPr lang="en-US"/>
           </a:p>
@@ -4851,7 +4851,7 @@
           <a:p>
             <a:fld id="{8489B6BE-DF36-2D48-B10B-C50A45407260}" type="datetimeFigureOut">
               <a:rPr lang="en-US" smtClean="0"/>
-              <a:t>12/27/18</a:t>
+              <a:t>1/3/19</a:t>
             </a:fld>
             <a:endParaRPr lang="en-US"/>
           </a:p>
@@ -5263,7 +5263,7 @@
           <a:p>
             <a:fld id="{8489B6BE-DF36-2D48-B10B-C50A45407260}" type="datetimeFigureOut">
               <a:rPr lang="en-US" smtClean="0"/>
-              <a:t>12/27/18</a:t>
+              <a:t>1/3/19</a:t>
             </a:fld>
             <a:endParaRPr lang="en-US"/>
           </a:p>
@@ -5404,7 +5404,7 @@
           <a:p>
             <a:fld id="{8489B6BE-DF36-2D48-B10B-C50A45407260}" type="datetimeFigureOut">
               <a:rPr lang="en-US" smtClean="0"/>
-              <a:t>12/27/18</a:t>
+              <a:t>1/3/19</a:t>
             </a:fld>
             <a:endParaRPr lang="en-US"/>
           </a:p>
@@ -5517,7 +5517,7 @@
           <a:p>
             <a:fld id="{8489B6BE-DF36-2D48-B10B-C50A45407260}" type="datetimeFigureOut">
               <a:rPr lang="en-US" smtClean="0"/>
-              <a:t>12/27/18</a:t>
+              <a:t>1/3/19</a:t>
             </a:fld>
             <a:endParaRPr lang="en-US"/>
           </a:p>
@@ -5828,7 +5828,7 @@
           <a:p>
             <a:fld id="{8489B6BE-DF36-2D48-B10B-C50A45407260}" type="datetimeFigureOut">
               <a:rPr lang="en-US" smtClean="0"/>
-              <a:t>12/27/18</a:t>
+              <a:t>1/3/19</a:t>
             </a:fld>
             <a:endParaRPr lang="en-US"/>
           </a:p>
@@ -6116,7 +6116,7 @@
           <a:p>
             <a:fld id="{8489B6BE-DF36-2D48-B10B-C50A45407260}" type="datetimeFigureOut">
               <a:rPr lang="en-US" smtClean="0"/>
-              <a:t>12/27/18</a:t>
+              <a:t>1/3/19</a:t>
             </a:fld>
             <a:endParaRPr lang="en-US"/>
           </a:p>
@@ -6357,7 +6357,7 @@
           <a:p>
             <a:fld id="{8489B6BE-DF36-2D48-B10B-C50A45407260}" type="datetimeFigureOut">
               <a:rPr lang="en-US" smtClean="0"/>
-              <a:t>12/27/18</a:t>
+              <a:t>1/3/19</a:t>
             </a:fld>
             <a:endParaRPr lang="en-US"/>
           </a:p>
@@ -8391,13 +8391,8 @@
             <a:pPr algn="ctr"/>
             <a:r>
               <a:rPr lang="en-US" sz="1400" b="1" u="sng" dirty="0"/>
-              <a:t>Glue </a:t>
+              <a:t>Glue Catalog</a:t>
             </a:r>
-            <a:r>
-              <a:rPr lang="en-US" sz="1400" b="1" u="sng" dirty="0" err="1"/>
-              <a:t>HCatalog</a:t>
-            </a:r>
-            <a:endParaRPr lang="en-US" sz="1400" b="1" u="sng" dirty="0"/>
           </a:p>
         </p:txBody>
       </p:sp>
@@ -15274,7 +15269,7 @@
         </p:blipFill>
         <p:spPr>
           <a:xfrm>
-            <a:off x="8648700" y="3139479"/>
+            <a:off x="9199059" y="3145012"/>
             <a:ext cx="762000" cy="1231900"/>
           </a:xfrm>
           <a:prstGeom prst="rect">
@@ -15516,14 +15511,14 @@
           <p:cNvCxnSpPr>
             <a:cxnSpLocks/>
             <a:stCxn id="28" idx="3"/>
-            <a:endCxn id="33" idx="1"/>
+            <a:endCxn id="40" idx="1"/>
           </p:cNvCxnSpPr>
           <p:nvPr/>
         </p:nvCxnSpPr>
         <p:spPr>
-          <a:xfrm flipV="1">
-            <a:off x="6291189" y="3755429"/>
-            <a:ext cx="2357511" cy="2678"/>
+          <a:xfrm>
+            <a:off x="6291189" y="3758107"/>
+            <a:ext cx="1636853" cy="2855"/>
           </a:xfrm>
           <a:prstGeom prst="straightConnector1">
             <a:avLst/>
@@ -15893,8 +15888,8 @@
         </p:nvCxnSpPr>
         <p:spPr>
           <a:xfrm>
-            <a:off x="9410700" y="3755429"/>
-            <a:ext cx="991000" cy="5533"/>
+            <a:off x="9961059" y="3760962"/>
+            <a:ext cx="440641" cy="0"/>
           </a:xfrm>
           <a:prstGeom prst="straightConnector1">
             <a:avLst/>
@@ -15905,6 +15900,88 @@
             </a:solidFill>
             <a:headEnd type="none" w="med" len="sm"/>
             <a:tailEnd type="arrow" w="med" len="sm"/>
+          </a:ln>
+        </p:spPr>
+        <p:style>
+          <a:lnRef idx="1">
+            <a:schemeClr val="accent1"/>
+          </a:lnRef>
+          <a:fillRef idx="0">
+            <a:schemeClr val="accent1"/>
+          </a:fillRef>
+          <a:effectRef idx="0">
+            <a:schemeClr val="accent1"/>
+          </a:effectRef>
+          <a:fontRef idx="minor">
+            <a:schemeClr val="tx1"/>
+          </a:fontRef>
+        </p:style>
+      </p:cxnSp>
+      <p:pic>
+        <p:nvPicPr>
+          <p:cNvPr id="40" name="Graphic 39">
+            <a:extLst>
+              <a:ext uri="{FF2B5EF4-FFF2-40B4-BE49-F238E27FC236}">
+                <a16:creationId xmlns:a16="http://schemas.microsoft.com/office/drawing/2014/main" id="{FCABC4B8-140E-6842-936B-8D615F92FADC}"/>
+              </a:ext>
+            </a:extLst>
+          </p:cNvPr>
+          <p:cNvPicPr>
+            <a:picLocks noChangeAspect="1"/>
+          </p:cNvPicPr>
+          <p:nvPr/>
+        </p:nvPicPr>
+        <p:blipFill>
+          <a:blip r:embed="rId20">
+            <a:extLst>
+              <a:ext uri="{96DAC541-7B7A-43D3-8B79-37D633B846F1}">
+                <asvg:svgBlip xmlns:asvg="http://schemas.microsoft.com/office/drawing/2016/SVG/main" r:embed="rId21"/>
+              </a:ext>
+            </a:extLst>
+          </a:blip>
+          <a:stretch>
+            <a:fillRect/>
+          </a:stretch>
+        </p:blipFill>
+        <p:spPr>
+          <a:xfrm>
+            <a:off x="7928042" y="3145012"/>
+            <a:ext cx="780697" cy="1231900"/>
+          </a:xfrm>
+          <a:prstGeom prst="rect">
+            <a:avLst/>
+          </a:prstGeom>
+        </p:spPr>
+      </p:pic>
+      <p:cxnSp>
+        <p:nvCxnSpPr>
+          <p:cNvPr id="8" name="Straight Arrow Connector 7">
+            <a:extLst>
+              <a:ext uri="{FF2B5EF4-FFF2-40B4-BE49-F238E27FC236}">
+                <a16:creationId xmlns:a16="http://schemas.microsoft.com/office/drawing/2014/main" id="{F683DEBA-2DD4-2C4E-8244-B7FF65AD9E65}"/>
+              </a:ext>
+            </a:extLst>
+          </p:cNvPr>
+          <p:cNvCxnSpPr>
+            <a:cxnSpLocks/>
+            <a:stCxn id="40" idx="3"/>
+            <a:endCxn id="33" idx="1"/>
+          </p:cNvCxnSpPr>
+          <p:nvPr/>
+        </p:nvCxnSpPr>
+        <p:spPr>
+          <a:xfrm>
+            <a:off x="8708739" y="3760962"/>
+            <a:ext cx="490320" cy="0"/>
+          </a:xfrm>
+          <a:prstGeom prst="straightConnector1">
+            <a:avLst/>
+          </a:prstGeom>
+          <a:ln>
+            <a:solidFill>
+              <a:schemeClr val="accent2"/>
+            </a:solidFill>
+            <a:tailEnd type="arrow"/>
           </a:ln>
         </p:spPr>
         <p:style>

</xml_diff>